<commit_message>
Adding Intro and Outro slides
</commit_message>
<xml_diff>
--- a/00_02-WhatYouShouldKnow.pptx
+++ b/00_02-WhatYouShouldKnow.pptx
@@ -14,8 +14,9 @@
   <p:sldIdLst>
     <p:sldId id="264" r:id="rId9"/>
     <p:sldId id="265" r:id="rId10"/>
-    <p:sldId id="266" r:id="rId11"/>
-    <p:sldId id="267" r:id="rId12"/>
+    <p:sldId id="268" r:id="rId11"/>
+    <p:sldId id="266" r:id="rId12"/>
+    <p:sldId id="267" r:id="rId13"/>
   </p:sldIdLst>
   <p:sldSz cx="12192000" cy="6858000"/>
   <p:notesSz cx="6858000" cy="9144000"/>
@@ -367,7 +368,7 @@
           <a:p>
             <a:fld id="{02243223-8F5B-47D4-B6E3-70CECE8A9622}" type="datetimeFigureOut">
               <a:rPr lang="en-US" smtClean="0"/>
-              <a:t>9/26/2017</a:t>
+              <a:t>6/4/2018</a:t>
             </a:fld>
             <a:endParaRPr lang="en-US"/>
           </a:p>
@@ -2843,7 +2844,7 @@
               <a:pPr>
                 <a:defRPr/>
               </a:pPr>
-              <a:t>9/26/2017</a:t>
+              <a:t>6/4/2018</a:t>
             </a:fld>
             <a:endParaRPr lang="en-US" altLang="en-US"/>
           </a:p>
@@ -10374,7 +10375,277 @@
 </file>
 
 <file path=ppt/slides/slide2.xml><?xml version="1.0" encoding="utf-8"?>
-<p:sld xmlns:a="http://schemas.openxmlformats.org/drawingml/2006/main" xmlns:r="http://schemas.openxmlformats.org/officeDocument/2006/relationships" xmlns:p="http://schemas.openxmlformats.org/presentationml/2006/main">
+<p:sld xmlns:a="http://schemas.openxmlformats.org/drawingml/2006/main" xmlns:r="http://schemas.openxmlformats.org/officeDocument/2006/relationships" xmlns:p="http://schemas.openxmlformats.org/presentationml/2006/main" showMasterPhAnim="0">
+  <p:cSld>
+    <p:spTree>
+      <p:nvGrpSpPr>
+        <p:cNvPr id="1" name=""/>
+        <p:cNvGrpSpPr/>
+        <p:nvPr/>
+      </p:nvGrpSpPr>
+      <p:grpSpPr>
+        <a:xfrm>
+          <a:off x="0" y="0"/>
+          <a:ext cx="0" cy="0"/>
+          <a:chOff x="0" y="0"/>
+          <a:chExt cx="0" cy="0"/>
+        </a:xfrm>
+      </p:grpSpPr>
+      <p:sp>
+        <p:nvSpPr>
+          <p:cNvPr id="2" name="Title 1">
+            <a:extLst>
+              <a:ext uri="{FF2B5EF4-FFF2-40B4-BE49-F238E27FC236}">
+                <a16:creationId xmlns:a16="http://schemas.microsoft.com/office/drawing/2014/main" id="{71198CC5-CF04-49B3-AB3F-D9AE57AC4961}"/>
+              </a:ext>
+            </a:extLst>
+          </p:cNvPr>
+          <p:cNvSpPr>
+            <a:spLocks noGrp="1"/>
+          </p:cNvSpPr>
+          <p:nvPr>
+            <p:ph type="title"/>
+          </p:nvPr>
+        </p:nvSpPr>
+        <p:spPr>
+          <a:xfrm>
+            <a:off x="851650" y="482203"/>
+            <a:ext cx="11106670" cy="964406"/>
+          </a:xfrm>
+        </p:spPr>
+        <p:txBody>
+          <a:bodyPr/>
+          <a:lstStyle/>
+          <a:p>
+            <a:r>
+              <a:rPr lang="en-US" dirty="0"/>
+              <a:t>Improving </a:t>
+            </a:r>
+            <a:r>
+              <a:rPr lang="en-US" i="1" dirty="0"/>
+              <a:t>existing</a:t>
+            </a:r>
+            <a:r>
+              <a:rPr lang="en-US" dirty="0"/>
+              <a:t> ASP.NET MVC applications</a:t>
+            </a:r>
+          </a:p>
+        </p:txBody>
+      </p:sp>
+      <p:sp>
+        <p:nvSpPr>
+          <p:cNvPr id="3" name="Content Placeholder 2">
+            <a:extLst>
+              <a:ext uri="{FF2B5EF4-FFF2-40B4-BE49-F238E27FC236}">
+                <a16:creationId xmlns:a16="http://schemas.microsoft.com/office/drawing/2014/main" id="{B1ECC034-E9C8-462D-B018-01AD5363DD42}"/>
+              </a:ext>
+            </a:extLst>
+          </p:cNvPr>
+          <p:cNvSpPr>
+            <a:spLocks noGrp="1"/>
+          </p:cNvSpPr>
+          <p:nvPr>
+            <p:ph idx="1"/>
+          </p:nvPr>
+        </p:nvSpPr>
+        <p:spPr/>
+        <p:txBody>
+          <a:bodyPr/>
+          <a:lstStyle/>
+          <a:p>
+            <a:r>
+              <a:rPr lang="en-US" dirty="0"/>
+              <a:t>Built using any of the introductory tutorials</a:t>
+            </a:r>
+          </a:p>
+          <a:p>
+            <a:r>
+              <a:rPr lang="en-US" dirty="0"/>
+              <a:t>Consuming basic ASP.NET MVC framework APIs</a:t>
+            </a:r>
+          </a:p>
+        </p:txBody>
+      </p:sp>
+    </p:spTree>
+    <p:extLst>
+      <p:ext uri="{BB962C8B-B14F-4D97-AF65-F5344CB8AC3E}">
+        <p14:creationId xmlns:p14="http://schemas.microsoft.com/office/powerpoint/2010/main" val="2635279139"/>
+      </p:ext>
+    </p:extLst>
+  </p:cSld>
+  <p:clrMapOvr>
+    <a:masterClrMapping/>
+  </p:clrMapOvr>
+  <p:transition>
+    <p:dissolve/>
+  </p:transition>
+  <p:timing>
+    <p:tnLst>
+      <p:par>
+        <p:cTn id="1" dur="indefinite" restart="never" nodeType="tmRoot">
+          <p:childTnLst>
+            <p:seq concurrent="1" nextAc="seek">
+              <p:cTn id="2" dur="indefinite" nodeType="mainSeq">
+                <p:childTnLst>
+                  <p:par>
+                    <p:cTn id="3" fill="hold">
+                      <p:stCondLst>
+                        <p:cond delay="indefinite"/>
+                        <p:cond evt="onBegin" delay="0">
+                          <p:tn val="2"/>
+                        </p:cond>
+                      </p:stCondLst>
+                      <p:childTnLst>
+                        <p:par>
+                          <p:cTn id="4" fill="hold">
+                            <p:stCondLst>
+                              <p:cond delay="0"/>
+                            </p:stCondLst>
+                            <p:childTnLst>
+                              <p:par>
+                                <p:cTn id="5" presetID="-1074306296" presetClass="entr" presetSubtype="0" fill="hold" grpId="0" nodeType="withEffect">
+                                  <p:stCondLst>
+                                    <p:cond delay="0"/>
+                                  </p:stCondLst>
+                                  <p:childTnLst>
+                                    <p:set>
+                                      <p:cBhvr>
+                                        <p:cTn id="6" dur="1" fill="hold">
+                                          <p:stCondLst>
+                                            <p:cond delay="499"/>
+                                          </p:stCondLst>
+                                        </p:cTn>
+                                        <p:tgtEl>
+                                          <p:spTgt spid="2"/>
+                                        </p:tgtEl>
+                                        <p:attrNameLst>
+                                          <p:attrName>style.visibility</p:attrName>
+                                        </p:attrNameLst>
+                                      </p:cBhvr>
+                                      <p:to>
+                                        <p:strVal val="visible"/>
+                                      </p:to>
+                                    </p:set>
+                                  </p:childTnLst>
+                                </p:cTn>
+                              </p:par>
+                            </p:childTnLst>
+                          </p:cTn>
+                        </p:par>
+                        <p:par>
+                          <p:cTn id="7" fill="hold">
+                            <p:stCondLst>
+                              <p:cond delay="500"/>
+                            </p:stCondLst>
+                            <p:childTnLst>
+                              <p:par>
+                                <p:cTn id="8" presetID="-1074306296" presetClass="entr" presetSubtype="0" fill="hold" grpId="0" nodeType="afterEffect">
+                                  <p:stCondLst>
+                                    <p:cond delay="1000"/>
+                                  </p:stCondLst>
+                                  <p:childTnLst>
+                                    <p:set>
+                                      <p:cBhvr>
+                                        <p:cTn id="9" dur="1" fill="hold">
+                                          <p:stCondLst>
+                                            <p:cond delay="499"/>
+                                          </p:stCondLst>
+                                        </p:cTn>
+                                        <p:tgtEl>
+                                          <p:spTgt spid="3">
+                                            <p:txEl>
+                                              <p:pRg st="0" end="0"/>
+                                            </p:txEl>
+                                          </p:spTgt>
+                                        </p:tgtEl>
+                                        <p:attrNameLst>
+                                          <p:attrName>style.visibility</p:attrName>
+                                        </p:attrNameLst>
+                                      </p:cBhvr>
+                                      <p:to>
+                                        <p:strVal val="visible"/>
+                                      </p:to>
+                                    </p:set>
+                                  </p:childTnLst>
+                                </p:cTn>
+                              </p:par>
+                            </p:childTnLst>
+                          </p:cTn>
+                        </p:par>
+                        <p:par>
+                          <p:cTn id="10" fill="hold">
+                            <p:stCondLst>
+                              <p:cond delay="2000"/>
+                            </p:stCondLst>
+                            <p:childTnLst>
+                              <p:par>
+                                <p:cTn id="11" presetID="-1074306296" presetClass="entr" presetSubtype="0" fill="hold" grpId="0" nodeType="afterEffect">
+                                  <p:stCondLst>
+                                    <p:cond delay="1000"/>
+                                  </p:stCondLst>
+                                  <p:childTnLst>
+                                    <p:set>
+                                      <p:cBhvr>
+                                        <p:cTn id="12" dur="1" fill="hold">
+                                          <p:stCondLst>
+                                            <p:cond delay="499"/>
+                                          </p:stCondLst>
+                                        </p:cTn>
+                                        <p:tgtEl>
+                                          <p:spTgt spid="3">
+                                            <p:txEl>
+                                              <p:pRg st="1" end="1"/>
+                                            </p:txEl>
+                                          </p:spTgt>
+                                        </p:tgtEl>
+                                        <p:attrNameLst>
+                                          <p:attrName>style.visibility</p:attrName>
+                                        </p:attrNameLst>
+                                      </p:cBhvr>
+                                      <p:to>
+                                        <p:strVal val="visible"/>
+                                      </p:to>
+                                    </p:set>
+                                  </p:childTnLst>
+                                </p:cTn>
+                              </p:par>
+                            </p:childTnLst>
+                          </p:cTn>
+                        </p:par>
+                      </p:childTnLst>
+                    </p:cTn>
+                  </p:par>
+                </p:childTnLst>
+              </p:cTn>
+              <p:prevCondLst>
+                <p:cond evt="onPrev" delay="0">
+                  <p:tgtEl>
+                    <p:sldTgt/>
+                  </p:tgtEl>
+                </p:cond>
+              </p:prevCondLst>
+              <p:nextCondLst>
+                <p:cond evt="onNext" delay="0">
+                  <p:tgtEl>
+                    <p:sldTgt/>
+                  </p:tgtEl>
+                </p:cond>
+              </p:nextCondLst>
+            </p:seq>
+          </p:childTnLst>
+        </p:cTn>
+      </p:par>
+    </p:tnLst>
+    <p:bldLst>
+      <p:bldP spid="2" grpId="0" autoUpdateAnimBg="0"/>
+      <p:bldP spid="3" grpId="0" build="p" bldLvl="5" autoUpdateAnimBg="0"/>
+    </p:bldLst>
+  </p:timing>
+</p:sld>
+</file>
+
+<file path=ppt/slides/slide3.xml><?xml version="1.0" encoding="utf-8"?>
+<p:sld xmlns:a="http://schemas.openxmlformats.org/drawingml/2006/main" xmlns:r="http://schemas.openxmlformats.org/officeDocument/2006/relationships" xmlns:p="http://schemas.openxmlformats.org/presentationml/2006/main" showMasterPhAnim="0">
   <p:cSld>
     <p:spTree>
       <p:nvGrpSpPr>
@@ -10441,41 +10712,39 @@
           <a:p>
             <a:r>
               <a:rPr lang="en-US" dirty="0"/>
-              <a:t>.NET platform  (.NET Core or full .NET Framework)</a:t>
+              <a:t>Create a new ASP.NET MVC web application project</a:t>
             </a:r>
           </a:p>
           <a:p>
             <a:r>
               <a:rPr lang="en-US" dirty="0"/>
-              <a:t>C#</a:t>
+              <a:t>Controller Actions</a:t>
             </a:r>
           </a:p>
           <a:p>
             <a:r>
               <a:rPr lang="en-US" dirty="0"/>
-              <a:t>HTML &amp; CSS</a:t>
+              <a:t>Routing</a:t>
             </a:r>
           </a:p>
           <a:p>
-            <a:endParaRPr lang="en-US" b="1" dirty="0"/>
+            <a:r>
+              <a:rPr lang="en-US" dirty="0"/>
+              <a:t>Razor View Engine</a:t>
+            </a:r>
           </a:p>
           <a:p>
             <a:r>
-              <a:rPr lang="en-US" b="1" dirty="0"/>
-              <a:t>BONUS:</a:t>
+              <a:rPr lang="en-US" dirty="0"/>
+              <a:t>NuGet Package Manager</a:t>
             </a:r>
-            <a:r>
-              <a:rPr lang="en-US" dirty="0"/>
-              <a:t>  ASP.NET MVC or ASP.NET Core MVC</a:t>
-            </a:r>
-            <a:endParaRPr lang="en-US" b="1" dirty="0"/>
           </a:p>
         </p:txBody>
       </p:sp>
     </p:spTree>
     <p:extLst>
       <p:ext uri="{BB962C8B-B14F-4D97-AF65-F5344CB8AC3E}">
-        <p14:creationId xmlns:p14="http://schemas.microsoft.com/office/powerpoint/2010/main" val="2635279139"/>
+        <p14:creationId xmlns:p14="http://schemas.microsoft.com/office/powerpoint/2010/main" val="1953494134"/>
       </p:ext>
     </p:extLst>
   </p:cSld>
@@ -10485,11 +10754,286 @@
   <p:transition>
     <p:dissolve/>
   </p:transition>
+  <p:timing>
+    <p:tnLst>
+      <p:par>
+        <p:cTn id="1" dur="indefinite" restart="never" nodeType="tmRoot">
+          <p:childTnLst>
+            <p:seq concurrent="1" nextAc="seek">
+              <p:cTn id="2" dur="indefinite" nodeType="mainSeq">
+                <p:childTnLst>
+                  <p:par>
+                    <p:cTn id="3" fill="hold">
+                      <p:stCondLst>
+                        <p:cond delay="indefinite"/>
+                      </p:stCondLst>
+                      <p:childTnLst>
+                        <p:par>
+                          <p:cTn id="4" fill="hold">
+                            <p:stCondLst>
+                              <p:cond delay="0"/>
+                            </p:stCondLst>
+                            <p:childTnLst>
+                              <p:par>
+                                <p:cTn id="5" presetID="1" presetClass="entr" presetSubtype="0" fill="hold" nodeType="clickEffect">
+                                  <p:stCondLst>
+                                    <p:cond delay="0"/>
+                                  </p:stCondLst>
+                                  <p:childTnLst>
+                                    <p:set>
+                                      <p:cBhvr>
+                                        <p:cTn id="6" dur="1" fill="hold">
+                                          <p:stCondLst>
+                                            <p:cond delay="0"/>
+                                          </p:stCondLst>
+                                        </p:cTn>
+                                        <p:tgtEl>
+                                          <p:spTgt spid="3">
+                                            <p:txEl>
+                                              <p:pRg st="0" end="0"/>
+                                            </p:txEl>
+                                          </p:spTgt>
+                                        </p:tgtEl>
+                                        <p:attrNameLst>
+                                          <p:attrName>style.visibility</p:attrName>
+                                        </p:attrNameLst>
+                                      </p:cBhvr>
+                                      <p:to>
+                                        <p:strVal val="visible"/>
+                                      </p:to>
+                                    </p:set>
+                                  </p:childTnLst>
+                                </p:cTn>
+                              </p:par>
+                            </p:childTnLst>
+                          </p:cTn>
+                        </p:par>
+                      </p:childTnLst>
+                    </p:cTn>
+                  </p:par>
+                  <p:par>
+                    <p:cTn id="7" fill="hold">
+                      <p:stCondLst>
+                        <p:cond delay="indefinite"/>
+                      </p:stCondLst>
+                      <p:childTnLst>
+                        <p:par>
+                          <p:cTn id="8" fill="hold">
+                            <p:stCondLst>
+                              <p:cond delay="0"/>
+                            </p:stCondLst>
+                            <p:childTnLst>
+                              <p:par>
+                                <p:cTn id="9" presetID="1" presetClass="entr" presetSubtype="0" fill="hold" nodeType="clickEffect">
+                                  <p:stCondLst>
+                                    <p:cond delay="0"/>
+                                  </p:stCondLst>
+                                  <p:childTnLst>
+                                    <p:set>
+                                      <p:cBhvr>
+                                        <p:cTn id="10" dur="1" fill="hold">
+                                          <p:stCondLst>
+                                            <p:cond delay="0"/>
+                                          </p:stCondLst>
+                                        </p:cTn>
+                                        <p:tgtEl>
+                                          <p:spTgt spid="3">
+                                            <p:txEl>
+                                              <p:pRg st="1" end="1"/>
+                                            </p:txEl>
+                                          </p:spTgt>
+                                        </p:tgtEl>
+                                        <p:attrNameLst>
+                                          <p:attrName>style.visibility</p:attrName>
+                                        </p:attrNameLst>
+                                      </p:cBhvr>
+                                      <p:to>
+                                        <p:strVal val="visible"/>
+                                      </p:to>
+                                    </p:set>
+                                  </p:childTnLst>
+                                </p:cTn>
+                              </p:par>
+                            </p:childTnLst>
+                          </p:cTn>
+                        </p:par>
+                      </p:childTnLst>
+                    </p:cTn>
+                  </p:par>
+                  <p:par>
+                    <p:cTn id="11" fill="hold">
+                      <p:stCondLst>
+                        <p:cond delay="indefinite"/>
+                      </p:stCondLst>
+                      <p:childTnLst>
+                        <p:par>
+                          <p:cTn id="12" fill="hold">
+                            <p:stCondLst>
+                              <p:cond delay="0"/>
+                            </p:stCondLst>
+                            <p:childTnLst>
+                              <p:par>
+                                <p:cTn id="13" presetID="1" presetClass="entr" presetSubtype="0" fill="hold" nodeType="clickEffect">
+                                  <p:stCondLst>
+                                    <p:cond delay="0"/>
+                                  </p:stCondLst>
+                                  <p:childTnLst>
+                                    <p:set>
+                                      <p:cBhvr>
+                                        <p:cTn id="14" dur="1" fill="hold">
+                                          <p:stCondLst>
+                                            <p:cond delay="0"/>
+                                          </p:stCondLst>
+                                        </p:cTn>
+                                        <p:tgtEl>
+                                          <p:spTgt spid="3">
+                                            <p:txEl>
+                                              <p:pRg st="2" end="2"/>
+                                            </p:txEl>
+                                          </p:spTgt>
+                                        </p:tgtEl>
+                                        <p:attrNameLst>
+                                          <p:attrName>style.visibility</p:attrName>
+                                        </p:attrNameLst>
+                                      </p:cBhvr>
+                                      <p:to>
+                                        <p:strVal val="visible"/>
+                                      </p:to>
+                                    </p:set>
+                                  </p:childTnLst>
+                                </p:cTn>
+                              </p:par>
+                            </p:childTnLst>
+                          </p:cTn>
+                        </p:par>
+                      </p:childTnLst>
+                    </p:cTn>
+                  </p:par>
+                  <p:par>
+                    <p:cTn id="15" fill="hold">
+                      <p:stCondLst>
+                        <p:cond delay="indefinite"/>
+                      </p:stCondLst>
+                      <p:childTnLst>
+                        <p:par>
+                          <p:cTn id="16" fill="hold">
+                            <p:stCondLst>
+                              <p:cond delay="0"/>
+                            </p:stCondLst>
+                            <p:childTnLst>
+                              <p:par>
+                                <p:cTn id="17" presetID="1" presetClass="entr" presetSubtype="0" fill="hold" nodeType="clickEffect">
+                                  <p:stCondLst>
+                                    <p:cond delay="0"/>
+                                  </p:stCondLst>
+                                  <p:childTnLst>
+                                    <p:set>
+                                      <p:cBhvr>
+                                        <p:cTn id="18" dur="1" fill="hold">
+                                          <p:stCondLst>
+                                            <p:cond delay="0"/>
+                                          </p:stCondLst>
+                                        </p:cTn>
+                                        <p:tgtEl>
+                                          <p:spTgt spid="3">
+                                            <p:txEl>
+                                              <p:pRg st="3" end="3"/>
+                                            </p:txEl>
+                                          </p:spTgt>
+                                        </p:tgtEl>
+                                        <p:attrNameLst>
+                                          <p:attrName>style.visibility</p:attrName>
+                                        </p:attrNameLst>
+                                      </p:cBhvr>
+                                      <p:to>
+                                        <p:strVal val="visible"/>
+                                      </p:to>
+                                    </p:set>
+                                  </p:childTnLst>
+                                </p:cTn>
+                              </p:par>
+                            </p:childTnLst>
+                          </p:cTn>
+                        </p:par>
+                      </p:childTnLst>
+                    </p:cTn>
+                  </p:par>
+                  <p:par>
+                    <p:cTn id="19" fill="hold">
+                      <p:stCondLst>
+                        <p:cond delay="indefinite"/>
+                      </p:stCondLst>
+                      <p:childTnLst>
+                        <p:par>
+                          <p:cTn id="20" fill="hold">
+                            <p:stCondLst>
+                              <p:cond delay="0"/>
+                            </p:stCondLst>
+                            <p:childTnLst>
+                              <p:par>
+                                <p:cTn id="21" presetID="1" presetClass="entr" presetSubtype="0" fill="hold" nodeType="clickEffect">
+                                  <p:stCondLst>
+                                    <p:cond delay="0"/>
+                                  </p:stCondLst>
+                                  <p:childTnLst>
+                                    <p:set>
+                                      <p:cBhvr>
+                                        <p:cTn id="22" dur="1" fill="hold">
+                                          <p:stCondLst>
+                                            <p:cond delay="0"/>
+                                          </p:stCondLst>
+                                        </p:cTn>
+                                        <p:tgtEl>
+                                          <p:spTgt spid="3">
+                                            <p:txEl>
+                                              <p:pRg st="4" end="4"/>
+                                            </p:txEl>
+                                          </p:spTgt>
+                                        </p:tgtEl>
+                                        <p:attrNameLst>
+                                          <p:attrName>style.visibility</p:attrName>
+                                        </p:attrNameLst>
+                                      </p:cBhvr>
+                                      <p:to>
+                                        <p:strVal val="visible"/>
+                                      </p:to>
+                                    </p:set>
+                                  </p:childTnLst>
+                                </p:cTn>
+                              </p:par>
+                            </p:childTnLst>
+                          </p:cTn>
+                        </p:par>
+                      </p:childTnLst>
+                    </p:cTn>
+                  </p:par>
+                </p:childTnLst>
+              </p:cTn>
+              <p:prevCondLst>
+                <p:cond evt="onPrev" delay="0">
+                  <p:tgtEl>
+                    <p:sldTgt/>
+                  </p:tgtEl>
+                </p:cond>
+              </p:prevCondLst>
+              <p:nextCondLst>
+                <p:cond evt="onNext" delay="0">
+                  <p:tgtEl>
+                    <p:sldTgt/>
+                  </p:tgtEl>
+                </p:cond>
+              </p:nextCondLst>
+            </p:seq>
+          </p:childTnLst>
+        </p:cTn>
+      </p:par>
+    </p:tnLst>
+  </p:timing>
 </p:sld>
 </file>
 
-<file path=ppt/slides/slide3.xml><?xml version="1.0" encoding="utf-8"?>
-<p:sld xmlns:a="http://schemas.openxmlformats.org/drawingml/2006/main" xmlns:r="http://schemas.openxmlformats.org/officeDocument/2006/relationships" xmlns:p="http://schemas.openxmlformats.org/presentationml/2006/main">
+<file path=ppt/slides/slide4.xml><?xml version="1.0" encoding="utf-8"?>
+<p:sld xmlns:a="http://schemas.openxmlformats.org/drawingml/2006/main" xmlns:r="http://schemas.openxmlformats.org/officeDocument/2006/relationships" xmlns:p="http://schemas.openxmlformats.org/presentationml/2006/main" showMasterPhAnim="0">
   <p:cSld>
     <p:spTree>
       <p:nvGrpSpPr>
@@ -10528,7 +11072,7 @@
           <a:p>
             <a:r>
               <a:rPr lang="en-US" dirty="0"/>
-              <a:t>Prerequisite Courses</a:t>
+              <a:t>Nice to Have</a:t>
             </a:r>
           </a:p>
         </p:txBody>
@@ -10556,44 +11100,24 @@
           <a:p>
             <a:r>
               <a:rPr lang="en-US" dirty="0"/>
-              <a:t>.NET Framework:</a:t>
+              <a:t>Fully-functional ASP.NET MVC application</a:t>
             </a:r>
             <a:br>
               <a:rPr lang="en-US" dirty="0"/>
             </a:br>
+            <a:br>
+              <a:rPr lang="en-US" dirty="0"/>
+            </a:br>
             <a:r>
-              <a:rPr lang="en-US" i="1" dirty="0"/>
-              <a:t>Learning .NET Programming</a:t>
+              <a:rPr lang="en-US" dirty="0"/>
+              <a:t>or</a:t>
             </a:r>
-            <a:endParaRPr lang="en-US" dirty="0"/>
           </a:p>
           <a:p>
             <a:r>
               <a:rPr lang="en-US" dirty="0"/>
-              <a:t>C# Language:</a:t>
+              <a:t>Sample application (via exercise files)</a:t>
             </a:r>
-            <a:br>
-              <a:rPr lang="en-US" dirty="0"/>
-            </a:br>
-            <a:r>
-              <a:rPr lang="en-US" i="1" dirty="0"/>
-              <a:t>Learning C#</a:t>
-            </a:r>
-            <a:endParaRPr lang="en-US" dirty="0"/>
-          </a:p>
-          <a:p>
-            <a:r>
-              <a:rPr lang="en-US" dirty="0"/>
-              <a:t>HTML &amp; CSS:</a:t>
-            </a:r>
-            <a:br>
-              <a:rPr lang="en-US" dirty="0"/>
-            </a:br>
-            <a:r>
-              <a:rPr lang="en-US" i="1" dirty="0"/>
-              <a:t>HTML Essential Training</a:t>
-            </a:r>
-            <a:endParaRPr lang="en-US" dirty="0"/>
           </a:p>
         </p:txBody>
       </p:sp>
@@ -10610,10 +11134,132 @@
   <p:transition>
     <p:dissolve/>
   </p:transition>
+  <p:timing>
+    <p:tnLst>
+      <p:par>
+        <p:cTn id="1" dur="indefinite" restart="never" nodeType="tmRoot">
+          <p:childTnLst>
+            <p:seq concurrent="1" nextAc="seek">
+              <p:cTn id="2" dur="indefinite" nodeType="mainSeq">
+                <p:childTnLst>
+                  <p:par>
+                    <p:cTn id="3" fill="hold">
+                      <p:stCondLst>
+                        <p:cond delay="indefinite"/>
+                        <p:cond evt="onBegin" delay="0">
+                          <p:tn val="2"/>
+                        </p:cond>
+                      </p:stCondLst>
+                      <p:childTnLst>
+                        <p:par>
+                          <p:cTn id="4" fill="hold">
+                            <p:stCondLst>
+                              <p:cond delay="0"/>
+                            </p:stCondLst>
+                            <p:childTnLst>
+                              <p:par>
+                                <p:cTn id="5" presetID="1" presetClass="entr" presetSubtype="0" fill="hold" nodeType="afterEffect">
+                                  <p:stCondLst>
+                                    <p:cond delay="1500"/>
+                                  </p:stCondLst>
+                                  <p:childTnLst>
+                                    <p:set>
+                                      <p:cBhvr>
+                                        <p:cTn id="6" dur="1" fill="hold">
+                                          <p:stCondLst>
+                                            <p:cond delay="0"/>
+                                          </p:stCondLst>
+                                        </p:cTn>
+                                        <p:tgtEl>
+                                          <p:spTgt spid="3">
+                                            <p:txEl>
+                                              <p:pRg st="0" end="0"/>
+                                            </p:txEl>
+                                          </p:spTgt>
+                                        </p:tgtEl>
+                                        <p:attrNameLst>
+                                          <p:attrName>style.visibility</p:attrName>
+                                        </p:attrNameLst>
+                                      </p:cBhvr>
+                                      <p:to>
+                                        <p:strVal val="visible"/>
+                                      </p:to>
+                                    </p:set>
+                                  </p:childTnLst>
+                                </p:cTn>
+                              </p:par>
+                            </p:childTnLst>
+                          </p:cTn>
+                        </p:par>
+                        <p:par>
+                          <p:cTn id="7" fill="hold">
+                            <p:stCondLst>
+                              <p:cond delay="1500"/>
+                            </p:stCondLst>
+                            <p:childTnLst>
+                              <p:par>
+                                <p:cTn id="8" presetID="1" presetClass="entr" presetSubtype="0" fill="hold" nodeType="afterEffect">
+                                  <p:stCondLst>
+                                    <p:cond delay="1500"/>
+                                  </p:stCondLst>
+                                  <p:childTnLst>
+                                    <p:set>
+                                      <p:cBhvr>
+                                        <p:cTn id="9" dur="1" fill="hold">
+                                          <p:stCondLst>
+                                            <p:cond delay="0"/>
+                                          </p:stCondLst>
+                                        </p:cTn>
+                                        <p:tgtEl>
+                                          <p:spTgt spid="3">
+                                            <p:txEl>
+                                              <p:pRg st="1" end="1"/>
+                                            </p:txEl>
+                                          </p:spTgt>
+                                        </p:tgtEl>
+                                        <p:attrNameLst>
+                                          <p:attrName>style.visibility</p:attrName>
+                                        </p:attrNameLst>
+                                      </p:cBhvr>
+                                      <p:to>
+                                        <p:strVal val="visible"/>
+                                      </p:to>
+                                    </p:set>
+                                  </p:childTnLst>
+                                </p:cTn>
+                              </p:par>
+                            </p:childTnLst>
+                          </p:cTn>
+                        </p:par>
+                      </p:childTnLst>
+                    </p:cTn>
+                  </p:par>
+                </p:childTnLst>
+              </p:cTn>
+              <p:prevCondLst>
+                <p:cond evt="onPrev" delay="0">
+                  <p:tgtEl>
+                    <p:sldTgt/>
+                  </p:tgtEl>
+                </p:cond>
+              </p:prevCondLst>
+              <p:nextCondLst>
+                <p:cond evt="onNext" delay="0">
+                  <p:tgtEl>
+                    <p:sldTgt/>
+                  </p:tgtEl>
+                </p:cond>
+              </p:nextCondLst>
+            </p:seq>
+          </p:childTnLst>
+        </p:cTn>
+      </p:par>
+    </p:tnLst>
+  </p:timing>
 </p:sld>
 </file>
 
-<file path=ppt/slides/slide4.xml><?xml version="1.0" encoding="utf-8"?>
+<file path=ppt/slides/slide5.xml><?xml version="1.0" encoding="utf-8"?>
 <p:sld xmlns:a="http://schemas.openxmlformats.org/drawingml/2006/main" xmlns:r="http://schemas.openxmlformats.org/officeDocument/2006/relationships" xmlns:p="http://schemas.openxmlformats.org/presentationml/2006/main">
   <p:cSld>
     <p:spTree>
@@ -11219,7 +11865,7 @@
         <a:effectLst/>
         <a:extLst>
           <a:ext uri="{AF507438-7753-43e0-B8FC-AC1667EBCBE1}">
-            <a14:hiddenEffects xmlns:a14="http://schemas.microsoft.com/office/drawing/2010/main" xmlns="">
+            <a14:hiddenEffects xmlns="" xmlns:a14="http://schemas.microsoft.com/office/drawing/2010/main">
               <a:effectLst>
                 <a:outerShdw blurRad="63500" dist="38099" dir="2700000" algn="ctr" rotWithShape="0">
                   <a:schemeClr val="bg2">
@@ -11299,7 +11945,7 @@
         <a:effectLst/>
         <a:extLst>
           <a:ext uri="{AF507438-7753-43e0-B8FC-AC1667EBCBE1}">
-            <a14:hiddenEffects xmlns:a14="http://schemas.microsoft.com/office/drawing/2010/main" xmlns="">
+            <a14:hiddenEffects xmlns="" xmlns:a14="http://schemas.microsoft.com/office/drawing/2010/main">
               <a:effectLst>
                 <a:outerShdw blurRad="63500" dist="38099" dir="2700000" algn="ctr" rotWithShape="0">
                   <a:schemeClr val="bg2">
@@ -11973,7 +12619,7 @@
         <a:effectLst/>
         <a:extLst>
           <a:ext uri="{AF507438-7753-43e0-B8FC-AC1667EBCBE1}">
-            <a14:hiddenEffects xmlns:a14="http://schemas.microsoft.com/office/drawing/2010/main" xmlns="">
+            <a14:hiddenEffects xmlns="" xmlns:a14="http://schemas.microsoft.com/office/drawing/2010/main">
               <a:effectLst>
                 <a:outerShdw blurRad="63500" dist="38099" dir="2700000" algn="ctr" rotWithShape="0">
                   <a:schemeClr val="bg2">
@@ -12053,7 +12699,7 @@
         <a:effectLst/>
         <a:extLst>
           <a:ext uri="{AF507438-7753-43e0-B8FC-AC1667EBCBE1}">
-            <a14:hiddenEffects xmlns:a14="http://schemas.microsoft.com/office/drawing/2010/main" xmlns="">
+            <a14:hiddenEffects xmlns="" xmlns:a14="http://schemas.microsoft.com/office/drawing/2010/main">
               <a:effectLst>
                 <a:outerShdw blurRad="63500" dist="38099" dir="2700000" algn="ctr" rotWithShape="0">
                   <a:schemeClr val="bg2">
@@ -12402,7 +13048,7 @@
         <a:effectLst/>
         <a:extLst>
           <a:ext uri="{AF507438-7753-43e0-B8FC-AC1667EBCBE1}">
-            <a14:hiddenEffects xmlns:a14="http://schemas.microsoft.com/office/drawing/2010/main" xmlns="">
+            <a14:hiddenEffects xmlns="" xmlns:a14="http://schemas.microsoft.com/office/drawing/2010/main">
               <a:effectLst>
                 <a:outerShdw blurRad="63500" dist="38099" dir="2700000" algn="ctr" rotWithShape="0">
                   <a:schemeClr val="bg2">
@@ -12482,7 +13128,7 @@
         <a:effectLst/>
         <a:extLst>
           <a:ext uri="{AF507438-7753-43e0-B8FC-AC1667EBCBE1}">
-            <a14:hiddenEffects xmlns:a14="http://schemas.microsoft.com/office/drawing/2010/main" xmlns="">
+            <a14:hiddenEffects xmlns="" xmlns:a14="http://schemas.microsoft.com/office/drawing/2010/main">
               <a:effectLst>
                 <a:outerShdw blurRad="63500" dist="38099" dir="2700000" algn="ctr" rotWithShape="0">
                   <a:schemeClr val="bg2">
@@ -12831,7 +13477,7 @@
         <a:effectLst/>
         <a:extLst>
           <a:ext uri="{AF507438-7753-43e0-B8FC-AC1667EBCBE1}">
-            <a14:hiddenEffects xmlns:a14="http://schemas.microsoft.com/office/drawing/2010/main" xmlns="">
+            <a14:hiddenEffects xmlns="" xmlns:a14="http://schemas.microsoft.com/office/drawing/2010/main">
               <a:effectLst>
                 <a:outerShdw blurRad="63500" dist="38099" dir="2700000" algn="ctr" rotWithShape="0">
                   <a:schemeClr val="bg2">
@@ -12911,7 +13557,7 @@
         <a:effectLst/>
         <a:extLst>
           <a:ext uri="{AF507438-7753-43e0-B8FC-AC1667EBCBE1}">
-            <a14:hiddenEffects xmlns:a14="http://schemas.microsoft.com/office/drawing/2010/main" xmlns="">
+            <a14:hiddenEffects xmlns="" xmlns:a14="http://schemas.microsoft.com/office/drawing/2010/main">
               <a:effectLst>
                 <a:outerShdw blurRad="63500" dist="38099" dir="2700000" algn="ctr" rotWithShape="0">
                   <a:schemeClr val="bg2">
@@ -13260,7 +13906,7 @@
         <a:effectLst/>
         <a:extLst>
           <a:ext uri="{AF507438-7753-43e0-B8FC-AC1667EBCBE1}">
-            <a14:hiddenEffects xmlns:a14="http://schemas.microsoft.com/office/drawing/2010/main" xmlns="">
+            <a14:hiddenEffects xmlns="" xmlns:a14="http://schemas.microsoft.com/office/drawing/2010/main">
               <a:effectLst>
                 <a:outerShdw blurRad="63500" dist="38099" dir="2700000" algn="ctr" rotWithShape="0">
                   <a:schemeClr val="bg2">
@@ -13340,7 +13986,7 @@
         <a:effectLst/>
         <a:extLst>
           <a:ext uri="{AF507438-7753-43e0-B8FC-AC1667EBCBE1}">
-            <a14:hiddenEffects xmlns:a14="http://schemas.microsoft.com/office/drawing/2010/main" xmlns="">
+            <a14:hiddenEffects xmlns="" xmlns:a14="http://schemas.microsoft.com/office/drawing/2010/main">
               <a:effectLst>
                 <a:outerShdw blurRad="63500" dist="38099" dir="2700000" algn="ctr" rotWithShape="0">
                   <a:schemeClr val="bg2">
@@ -13689,7 +14335,7 @@
         <a:effectLst/>
         <a:extLst>
           <a:ext uri="{AF507438-7753-43e0-B8FC-AC1667EBCBE1}">
-            <a14:hiddenEffects xmlns:a14="http://schemas.microsoft.com/office/drawing/2010/main" xmlns="">
+            <a14:hiddenEffects xmlns="" xmlns:a14="http://schemas.microsoft.com/office/drawing/2010/main">
               <a:effectLst>
                 <a:outerShdw blurRad="63500" dist="38099" dir="2700000" algn="ctr" rotWithShape="0">
                   <a:schemeClr val="bg2">
@@ -13769,7 +14415,7 @@
         <a:effectLst/>
         <a:extLst>
           <a:ext uri="{AF507438-7753-43e0-B8FC-AC1667EBCBE1}">
-            <a14:hiddenEffects xmlns:a14="http://schemas.microsoft.com/office/drawing/2010/main" xmlns="">
+            <a14:hiddenEffects xmlns="" xmlns:a14="http://schemas.microsoft.com/office/drawing/2010/main">
               <a:effectLst>
                 <a:outerShdw blurRad="63500" dist="38099" dir="2700000" algn="ctr" rotWithShape="0">
                   <a:schemeClr val="bg2">

</xml_diff>